<commit_message>
CPU usage collector 추가 activity 미구현
</commit_message>
<xml_diff>
--- a/report/클라이언트 자료구조.pptx
+++ b/report/클라이언트 자료구조.pptx
@@ -7,6 +7,7 @@
   <p:sldIdLst>
     <p:sldId id="257" r:id="rId2"/>
     <p:sldId id="258" r:id="rId3"/>
+    <p:sldId id="259" r:id="rId4"/>
   </p:sldIdLst>
   <p:sldSz cx="12192000" cy="6858000"/>
   <p:notesSz cx="6858000" cy="9144000"/>
@@ -4620,6 +4621,327 @@
 </p:sld>
 </file>
 
+<file path=ppt/slides/slide3.xml><?xml version="1.0" encoding="utf-8"?>
+<p:sld xmlns:a="http://schemas.openxmlformats.org/drawingml/2006/main" xmlns:r="http://schemas.openxmlformats.org/officeDocument/2006/relationships" xmlns:p="http://schemas.openxmlformats.org/presentationml/2006/main">
+  <p:cSld>
+    <p:spTree>
+      <p:nvGrpSpPr>
+        <p:cNvPr id="1" name=""/>
+        <p:cNvGrpSpPr/>
+        <p:nvPr/>
+      </p:nvGrpSpPr>
+      <p:grpSpPr>
+        <a:xfrm>
+          <a:off x="0" y="0"/>
+          <a:ext cx="0" cy="0"/>
+          <a:chOff x="0" y="0"/>
+          <a:chExt cx="0" cy="0"/>
+        </a:xfrm>
+      </p:grpSpPr>
+      <p:sp>
+        <p:nvSpPr>
+          <p:cNvPr id="4" name="순서도: 자기 디스크 3"/>
+          <p:cNvSpPr/>
+          <p:nvPr/>
+        </p:nvSpPr>
+        <p:spPr>
+          <a:xfrm>
+            <a:off x="387177" y="2821464"/>
+            <a:ext cx="1845276" cy="3459892"/>
+          </a:xfrm>
+          <a:prstGeom prst="flowChartMagneticDisk">
+            <a:avLst/>
+          </a:prstGeom>
+        </p:spPr>
+        <p:style>
+          <a:lnRef idx="2">
+            <a:schemeClr val="accent4">
+              <a:shade val="50000"/>
+            </a:schemeClr>
+          </a:lnRef>
+          <a:fillRef idx="1">
+            <a:schemeClr val="accent4"/>
+          </a:fillRef>
+          <a:effectRef idx="0">
+            <a:schemeClr val="accent4"/>
+          </a:effectRef>
+          <a:fontRef idx="minor">
+            <a:schemeClr val="lt1"/>
+          </a:fontRef>
+        </p:style>
+        <p:txBody>
+          <a:bodyPr rtlCol="0" anchor="ctr"/>
+          <a:lstStyle/>
+          <a:p>
+            <a:pPr algn="ctr"/>
+            <a:r>
+              <a:rPr lang="en-US" altLang="ko-KR" dirty="0" smtClean="0"/>
+              <a:t>SQLite</a:t>
+            </a:r>
+          </a:p>
+          <a:p>
+            <a:pPr algn="ctr"/>
+            <a:r>
+              <a:rPr lang="en-US" altLang="ko-KR" dirty="0" smtClean="0"/>
+              <a:t>Local DB</a:t>
+            </a:r>
+            <a:endParaRPr lang="ko-KR" altLang="en-US" dirty="0"/>
+          </a:p>
+        </p:txBody>
+      </p:sp>
+      <p:sp>
+        <p:nvSpPr>
+          <p:cNvPr id="5" name="순서도: 자기 디스크 4"/>
+          <p:cNvSpPr/>
+          <p:nvPr/>
+        </p:nvSpPr>
+        <p:spPr>
+          <a:xfrm>
+            <a:off x="3826475" y="321279"/>
+            <a:ext cx="1845276" cy="3459892"/>
+          </a:xfrm>
+          <a:prstGeom prst="flowChartMagneticDisk">
+            <a:avLst/>
+          </a:prstGeom>
+        </p:spPr>
+        <p:style>
+          <a:lnRef idx="2">
+            <a:schemeClr val="accent4">
+              <a:shade val="50000"/>
+            </a:schemeClr>
+          </a:lnRef>
+          <a:fillRef idx="1">
+            <a:schemeClr val="accent4"/>
+          </a:fillRef>
+          <a:effectRef idx="0">
+            <a:schemeClr val="accent4"/>
+          </a:effectRef>
+          <a:fontRef idx="minor">
+            <a:schemeClr val="lt1"/>
+          </a:fontRef>
+        </p:style>
+        <p:txBody>
+          <a:bodyPr rtlCol="0" anchor="ctr"/>
+          <a:lstStyle/>
+          <a:p>
+            <a:pPr algn="ctr"/>
+            <a:r>
+              <a:rPr lang="en-US" altLang="ko-KR" dirty="0" smtClean="0"/>
+              <a:t>MySQL</a:t>
+            </a:r>
+            <a:endParaRPr lang="en-US" altLang="ko-KR" dirty="0" smtClean="0"/>
+          </a:p>
+          <a:p>
+            <a:pPr algn="ctr"/>
+            <a:r>
+              <a:rPr lang="en-US" altLang="ko-KR" dirty="0" smtClean="0"/>
+              <a:t>Server </a:t>
+            </a:r>
+            <a:r>
+              <a:rPr lang="en-US" altLang="ko-KR" dirty="0" smtClean="0"/>
+              <a:t>DB</a:t>
+            </a:r>
+            <a:endParaRPr lang="ko-KR" altLang="en-US" dirty="0"/>
+          </a:p>
+        </p:txBody>
+      </p:sp>
+      <p:sp>
+        <p:nvSpPr>
+          <p:cNvPr id="6" name="모서리가 둥근 직사각형 5"/>
+          <p:cNvSpPr/>
+          <p:nvPr/>
+        </p:nvSpPr>
+        <p:spPr>
+          <a:xfrm>
+            <a:off x="1309815" y="1507524"/>
+            <a:ext cx="1878227" cy="757881"/>
+          </a:xfrm>
+          <a:prstGeom prst="roundRect">
+            <a:avLst/>
+          </a:prstGeom>
+        </p:spPr>
+        <p:style>
+          <a:lnRef idx="2">
+            <a:schemeClr val="accent1">
+              <a:shade val="50000"/>
+            </a:schemeClr>
+          </a:lnRef>
+          <a:fillRef idx="1">
+            <a:schemeClr val="accent1"/>
+          </a:fillRef>
+          <a:effectRef idx="0">
+            <a:schemeClr val="accent1"/>
+          </a:effectRef>
+          <a:fontRef idx="minor">
+            <a:schemeClr val="lt1"/>
+          </a:fontRef>
+        </p:style>
+        <p:txBody>
+          <a:bodyPr rtlCol="0" anchor="ctr"/>
+          <a:lstStyle/>
+          <a:p>
+            <a:pPr algn="ctr"/>
+            <a:r>
+              <a:rPr lang="en-US" altLang="ko-KR" dirty="0" smtClean="0"/>
+              <a:t>HTTP connection module</a:t>
+            </a:r>
+            <a:endParaRPr lang="ko-KR" altLang="en-US" dirty="0"/>
+          </a:p>
+        </p:txBody>
+      </p:sp>
+      <p:cxnSp>
+        <p:nvCxnSpPr>
+          <p:cNvPr id="8" name="구부러진 연결선 7"/>
+          <p:cNvCxnSpPr/>
+          <p:nvPr/>
+        </p:nvCxnSpPr>
+        <p:spPr>
+          <a:xfrm flipV="1">
+            <a:off x="2002824" y="2191265"/>
+            <a:ext cx="1736124" cy="832021"/>
+          </a:xfrm>
+          <a:prstGeom prst="curvedConnector3">
+            <a:avLst/>
+          </a:prstGeom>
+          <a:ln>
+            <a:headEnd type="triangle"/>
+            <a:tailEnd type="triangle"/>
+          </a:ln>
+        </p:spPr>
+        <p:style>
+          <a:lnRef idx="1">
+            <a:schemeClr val="accent1"/>
+          </a:lnRef>
+          <a:fillRef idx="0">
+            <a:schemeClr val="accent1"/>
+          </a:fillRef>
+          <a:effectRef idx="0">
+            <a:schemeClr val="accent1"/>
+          </a:effectRef>
+          <a:fontRef idx="minor">
+            <a:schemeClr val="tx1"/>
+          </a:fontRef>
+        </p:style>
+      </p:cxnSp>
+      <p:sp>
+        <p:nvSpPr>
+          <p:cNvPr id="9" name="오른쪽 화살표 8"/>
+          <p:cNvSpPr/>
+          <p:nvPr/>
+        </p:nvSpPr>
+        <p:spPr>
+          <a:xfrm>
+            <a:off x="5782962" y="2356022"/>
+            <a:ext cx="2545492" cy="1721708"/>
+          </a:xfrm>
+          <a:prstGeom prst="rightArrow">
+            <a:avLst/>
+          </a:prstGeom>
+        </p:spPr>
+        <p:style>
+          <a:lnRef idx="2">
+            <a:schemeClr val="accent1">
+              <a:shade val="50000"/>
+            </a:schemeClr>
+          </a:lnRef>
+          <a:fillRef idx="1">
+            <a:schemeClr val="accent1"/>
+          </a:fillRef>
+          <a:effectRef idx="0">
+            <a:schemeClr val="accent1"/>
+          </a:effectRef>
+          <a:fontRef idx="minor">
+            <a:schemeClr val="lt1"/>
+          </a:fontRef>
+        </p:style>
+        <p:txBody>
+          <a:bodyPr rtlCol="0" anchor="ctr"/>
+          <a:lstStyle/>
+          <a:p>
+            <a:pPr algn="ctr"/>
+            <a:r>
+              <a:rPr lang="en-US" altLang="ko-KR" dirty="0" smtClean="0"/>
+              <a:t>Flask</a:t>
+            </a:r>
+            <a:endParaRPr lang="ko-KR" altLang="en-US" dirty="0"/>
+          </a:p>
+        </p:txBody>
+      </p:sp>
+      <p:sp>
+        <p:nvSpPr>
+          <p:cNvPr id="10" name="순서도: 처리 9"/>
+          <p:cNvSpPr/>
+          <p:nvPr/>
+        </p:nvSpPr>
+        <p:spPr>
+          <a:xfrm>
+            <a:off x="8493211" y="1351005"/>
+            <a:ext cx="2677297" cy="3682314"/>
+          </a:xfrm>
+          <a:prstGeom prst="flowChartProcess">
+            <a:avLst/>
+          </a:prstGeom>
+        </p:spPr>
+        <p:style>
+          <a:lnRef idx="2">
+            <a:schemeClr val="accent2">
+              <a:shade val="50000"/>
+            </a:schemeClr>
+          </a:lnRef>
+          <a:fillRef idx="1">
+            <a:schemeClr val="accent2"/>
+          </a:fillRef>
+          <a:effectRef idx="0">
+            <a:schemeClr val="accent2"/>
+          </a:effectRef>
+          <a:fontRef idx="minor">
+            <a:schemeClr val="lt1"/>
+          </a:fontRef>
+        </p:style>
+        <p:txBody>
+          <a:bodyPr rtlCol="0" anchor="ctr"/>
+          <a:lstStyle/>
+          <a:p>
+            <a:pPr algn="ctr"/>
+            <a:r>
+              <a:rPr lang="ko-KR" altLang="en-US" dirty="0" smtClean="0"/>
+              <a:t>웹 레벨 시각화</a:t>
+            </a:r>
+            <a:r>
+              <a:rPr lang="en-US" altLang="ko-KR" dirty="0" smtClean="0"/>
+              <a:t/>
+            </a:r>
+            <a:br>
+              <a:rPr lang="en-US" altLang="ko-KR" dirty="0" smtClean="0"/>
+            </a:br>
+            <a:r>
+              <a:rPr lang="en-US" altLang="ko-KR" dirty="0" smtClean="0"/>
+              <a:t>(text)</a:t>
+            </a:r>
+            <a:endParaRPr lang="ko-KR" altLang="en-US" dirty="0"/>
+          </a:p>
+        </p:txBody>
+      </p:sp>
+    </p:spTree>
+    <p:extLst>
+      <p:ext uri="{BB962C8B-B14F-4D97-AF65-F5344CB8AC3E}">
+        <p14:creationId xmlns:p14="http://schemas.microsoft.com/office/powerpoint/2010/main" val="3226373025"/>
+      </p:ext>
+    </p:extLst>
+  </p:cSld>
+  <p:clrMapOvr>
+    <a:masterClrMapping/>
+  </p:clrMapOvr>
+  <p:timing>
+    <p:tnLst>
+      <p:par>
+        <p:cTn id="1" dur="indefinite" restart="never" nodeType="tmRoot"/>
+      </p:par>
+    </p:tnLst>
+  </p:timing>
+</p:sld>
+</file>
+
 <file path=ppt/theme/theme1.xml><?xml version="1.0" encoding="utf-8"?>
 <a:theme xmlns:a="http://schemas.openxmlformats.org/drawingml/2006/main" name="Office 테마">
   <a:themeElements>

</xml_diff>